<commit_message>
Subo la documentación para la entrega final
</commit_message>
<xml_diff>
--- a/presentaciones/PPTX/Sprint 5.pptx
+++ b/presentaciones/PPTX/Sprint 5.pptx
@@ -9093,7 +9093,7 @@
                 <a:cs typeface="Proxima Nova"/>
                 <a:sym typeface="Proxima Nova"/>
               </a:rPr>
-              <a:t>Sprint 4 - Evolución de Riesgos</a:t>
+              <a:t>Sprint 5 - Evolución de Riesgos</a:t>
             </a:r>
             <a:endParaRPr b="1" sz="3020">
               <a:solidFill>
@@ -9472,7 +9472,7 @@
                 <a:cs typeface="Proxima Nova"/>
                 <a:sym typeface="Proxima Nova"/>
               </a:rPr>
-              <a:t>Sprint 4 - Evolución de Riesgos</a:t>
+              <a:t>Sprint 5 - Evolución de Riesgos</a:t>
             </a:r>
             <a:endParaRPr b="1" sz="3020">
               <a:solidFill>
@@ -9781,7 +9781,7 @@
             </a:pPr>
             <a:r>
               <a:rPr b="1" lang="es" sz="3020"/>
-              <a:t>Sprint 3 - Retro</a:t>
+              <a:t>Sprint 5 - Retro</a:t>
             </a:r>
             <a:endParaRPr b="1" sz="3020"/>
           </a:p>

</xml_diff>